<commit_message>
final tweaks to Mainz powerpoint
</commit_message>
<xml_diff>
--- a/Mainz_may_2024/intro-to-multiverse.pptx
+++ b/Mainz_may_2024/intro-to-multiverse.pptx
@@ -8368,7 +8368,7 @@
                 <a:latin typeface="Helvetica" panose="020B0604020202020204" pitchFamily="34" charset="0"/>
                 <a:cs typeface="Helvetica" panose="020B0604020202020204" pitchFamily="34" charset="0"/>
               </a:rPr>
-              <a:t>Step 1. Go to: https://github.com/StefanVermeent/multiverse-workshop</a:t>
+              <a:t>Step 1. Go to: https://osf.io/8ecdz/</a:t>
             </a:r>
             <a:endParaRPr lang="LID4096" sz="2400" dirty="0">
               <a:latin typeface="Helvetica" panose="020B0604020202020204" pitchFamily="34" charset="0"/>
@@ -8458,7 +8458,7 @@
                 <a:latin typeface="Helvetica" panose="020B0604020202020204" pitchFamily="34" charset="0"/>
                 <a:cs typeface="Helvetica" panose="020B0604020202020204" pitchFamily="34" charset="0"/>
               </a:rPr>
-              <a:t>Step 3. Unzip folder and navigate to ‘UU_April_2024’ folder</a:t>
+              <a:t>Step 3. Unzip folder and navigate to ‘Mainz_may_2024’ folder</a:t>
             </a:r>
           </a:p>
           <a:p>
@@ -8509,12 +8509,42 @@
           </a:p>
         </p:txBody>
       </p:sp>
+      <p:pic>
+        <p:nvPicPr>
+          <p:cNvPr id="7" name="Picture 6">
+            <a:extLst>
+              <a:ext uri="{FF2B5EF4-FFF2-40B4-BE49-F238E27FC236}">
+                <a16:creationId xmlns:a16="http://schemas.microsoft.com/office/drawing/2014/main" id="{2C0CA553-EC88-4998-41CB-076C66A01065}"/>
+              </a:ext>
+            </a:extLst>
+          </p:cNvPr>
+          <p:cNvPicPr>
+            <a:picLocks noChangeAspect="1"/>
+          </p:cNvPicPr>
+          <p:nvPr/>
+        </p:nvPicPr>
+        <p:blipFill>
+          <a:blip r:embed="rId2"/>
+          <a:stretch>
+            <a:fillRect/>
+          </a:stretch>
+        </p:blipFill>
+        <p:spPr>
+          <a:xfrm>
+            <a:off x="1600334" y="977909"/>
+            <a:ext cx="7817986" cy="4323740"/>
+          </a:xfrm>
+          <a:prstGeom prst="rect">
+            <a:avLst/>
+          </a:prstGeom>
+        </p:spPr>
+      </p:pic>
       <p:sp>
         <p:nvSpPr>
-          <p:cNvPr id="10" name="Oval 9">
+          <p:cNvPr id="9" name="Oval 8">
             <a:extLst>
               <a:ext uri="{FF2B5EF4-FFF2-40B4-BE49-F238E27FC236}">
-                <a16:creationId xmlns:a16="http://schemas.microsoft.com/office/drawing/2014/main" id="{4C2BE378-206B-B0AF-A3D6-B42591F21B15}"/>
+                <a16:creationId xmlns:a16="http://schemas.microsoft.com/office/drawing/2014/main" id="{A0D18887-339A-9342-4398-C4A5269F11B2}"/>
               </a:ext>
             </a:extLst>
           </p:cNvPr>
@@ -8523,8 +8553,8 @@
         </p:nvSpPr>
         <p:spPr>
           <a:xfrm>
-            <a:off x="-1531621" y="2137428"/>
-            <a:ext cx="973183" cy="392411"/>
+            <a:off x="2169183" y="3726625"/>
+            <a:ext cx="1819317" cy="374695"/>
           </a:xfrm>
           <a:prstGeom prst="ellipse">
             <a:avLst/>
@@ -8561,42 +8591,12 @@
           </a:p>
         </p:txBody>
       </p:sp>
-      <p:pic>
-        <p:nvPicPr>
-          <p:cNvPr id="4" name="Picture 3">
-            <a:extLst>
-              <a:ext uri="{FF2B5EF4-FFF2-40B4-BE49-F238E27FC236}">
-                <a16:creationId xmlns:a16="http://schemas.microsoft.com/office/drawing/2014/main" id="{115D0AA8-0F46-87A0-BE5A-8F84F7167864}"/>
-              </a:ext>
-            </a:extLst>
-          </p:cNvPr>
-          <p:cNvPicPr>
-            <a:picLocks noChangeAspect="1"/>
-          </p:cNvPicPr>
-          <p:nvPr/>
-        </p:nvPicPr>
-        <p:blipFill>
-          <a:blip r:embed="rId2"/>
-          <a:stretch>
-            <a:fillRect/>
-          </a:stretch>
-        </p:blipFill>
-        <p:spPr>
-          <a:xfrm>
-            <a:off x="1546037" y="1163560"/>
-            <a:ext cx="8058324" cy="4130024"/>
-          </a:xfrm>
-          <a:prstGeom prst="rect">
-            <a:avLst/>
-          </a:prstGeom>
-        </p:spPr>
-      </p:pic>
       <p:sp>
         <p:nvSpPr>
-          <p:cNvPr id="9" name="Oval 8">
+          <p:cNvPr id="10" name="Oval 9">
             <a:extLst>
               <a:ext uri="{FF2B5EF4-FFF2-40B4-BE49-F238E27FC236}">
-                <a16:creationId xmlns:a16="http://schemas.microsoft.com/office/drawing/2014/main" id="{A0D18887-339A-9342-4398-C4A5269F11B2}"/>
+                <a16:creationId xmlns:a16="http://schemas.microsoft.com/office/drawing/2014/main" id="{4C2BE378-206B-B0AF-A3D6-B42591F21B15}"/>
               </a:ext>
             </a:extLst>
           </p:cNvPr>
@@ -8605,8 +8605,8 @@
         </p:nvSpPr>
         <p:spPr>
           <a:xfrm>
-            <a:off x="-1300118" y="3640757"/>
-            <a:ext cx="1116875" cy="325120"/>
+            <a:off x="2169183" y="1746783"/>
+            <a:ext cx="1684022" cy="461665"/>
           </a:xfrm>
           <a:prstGeom prst="ellipse">
             <a:avLst/>

</xml_diff>